<commit_message>
problem and hypothesis statement
</commit_message>
<xml_diff>
--- a/Course 2/Week 2/Project/User_journey.pptx
+++ b/Course 2/Week 2/Project/User_journey.pptx
@@ -258,6 +258,11 @@
       </a:defRPr>
     </a:lvl9pPr>
   </p:defaultTextStyle>
+  <p:extLst>
+    <p:ext uri="{EFAFB233-063F-42B5-8137-9DF3F51BA10A}">
+      <p15:sldGuideLst xmlns:p15="http://schemas.microsoft.com/office/powerpoint/2012/main"/>
+    </p:ext>
+  </p:extLst>
 </p:presentation>
 </file>
 
@@ -21631,14 +21636,14 @@
           <p:nvPr>
             <p:extLst>
               <p:ext uri="{D42A27DB-BD31-4B8C-83A1-F6EECF244321}">
-                <p14:modId xmlns:p14="http://schemas.microsoft.com/office/powerpoint/2010/main" val="1920978221"/>
+                <p14:modId xmlns:p14="http://schemas.microsoft.com/office/powerpoint/2010/main" val="2421163518"/>
               </p:ext>
             </p:extLst>
           </p:nvPr>
         </p:nvGraphicFramePr>
         <p:xfrm>
           <a:off x="226350" y="848300"/>
-          <a:ext cx="8582100" cy="4535646"/>
+          <a:ext cx="8582100" cy="4551866"/>
         </p:xfrm>
         <a:graphic>
           <a:graphicData uri="http://schemas.openxmlformats.org/drawingml/2006/table">
@@ -22498,6 +22503,26 @@
                         </a:rPr>
                         <a:t>C. Apply filters</a:t>
                       </a:r>
+                    </a:p>
+                    <a:p>
+                      <a:pPr marL="0" lvl="0" indent="0" algn="l" rtl="0">
+                        <a:spcBef>
+                          <a:spcPts val="0"/>
+                        </a:spcBef>
+                        <a:spcAft>
+                          <a:spcPts val="0"/>
+                        </a:spcAft>
+                        <a:buNone/>
+                      </a:pPr>
+                      <a:r>
+                        <a:rPr lang="en" sz="1100" dirty="0">
+                          <a:latin typeface="Google Sans"/>
+                          <a:ea typeface="Google Sans"/>
+                          <a:cs typeface="Google Sans"/>
+                          <a:sym typeface="Google Sans"/>
+                        </a:rPr>
+                        <a:t>D. Use voice option</a:t>
+                      </a:r>
                       <a:endParaRPr sz="1100" dirty="0">
                         <a:latin typeface="Google Sans"/>
                         <a:ea typeface="Google Sans"/>
@@ -23279,13 +23304,33 @@
                         <a:buNone/>
                       </a:pPr>
                       <a:r>
-                        <a:rPr lang="en" sz="1100" dirty="0">
+                        <a:rPr lang="en-GB" sz="1100" dirty="0">
                           <a:latin typeface="Google Sans"/>
                           <a:ea typeface="Google Sans"/>
                           <a:cs typeface="Google Sans"/>
                           <a:sym typeface="Google Sans"/>
                         </a:rPr>
-                        <a:t>User emotions </a:t>
+                        <a:t>Anxious</a:t>
+                      </a:r>
+                    </a:p>
+                    <a:p>
+                      <a:pPr marL="0" lvl="0" indent="0" algn="l" rtl="0">
+                        <a:spcBef>
+                          <a:spcPts val="0"/>
+                        </a:spcBef>
+                        <a:spcAft>
+                          <a:spcPts val="0"/>
+                        </a:spcAft>
+                        <a:buNone/>
+                      </a:pPr>
+                      <a:r>
+                        <a:rPr lang="en-GB" sz="1100" dirty="0">
+                          <a:latin typeface="Google Sans"/>
+                          <a:ea typeface="Google Sans"/>
+                          <a:cs typeface="Google Sans"/>
+                          <a:sym typeface="Google Sans"/>
+                        </a:rPr>
+                        <a:t>Frustrated</a:t>
                       </a:r>
                       <a:endParaRPr sz="1100" dirty="0">
                         <a:latin typeface="Google Sans"/>
@@ -23364,15 +23409,15 @@
                         <a:buNone/>
                       </a:pPr>
                       <a:r>
-                        <a:rPr lang="en" sz="1100">
+                        <a:rPr lang="en-GB" sz="1100" dirty="0">
                           <a:latin typeface="Google Sans"/>
                           <a:ea typeface="Google Sans"/>
                           <a:cs typeface="Google Sans"/>
                           <a:sym typeface="Google Sans"/>
                         </a:rPr>
-                        <a:t>User emotions </a:t>
+                        <a:t>Troubled</a:t>
                       </a:r>
-                      <a:endParaRPr sz="1100">
+                      <a:endParaRPr sz="1100" dirty="0">
                         <a:latin typeface="Google Sans"/>
                         <a:ea typeface="Google Sans"/>
                         <a:cs typeface="Google Sans"/>
@@ -23389,7 +23434,7 @@
                         </a:spcAft>
                         <a:buNone/>
                       </a:pPr>
-                      <a:endParaRPr sz="1400"/>
+                      <a:endParaRPr sz="1400" dirty="0"/>
                     </a:p>
                   </a:txBody>
                   <a:tcPr marL="91425" marR="91425" marT="91425" marB="91425">
@@ -23449,15 +23494,35 @@
                         <a:buNone/>
                       </a:pPr>
                       <a:r>
-                        <a:rPr lang="en" sz="1100">
+                        <a:rPr lang="en-GB" sz="1100" dirty="0">
                           <a:latin typeface="Google Sans"/>
                           <a:ea typeface="Google Sans"/>
                           <a:cs typeface="Google Sans"/>
                           <a:sym typeface="Google Sans"/>
                         </a:rPr>
-                        <a:t>User emotions </a:t>
+                        <a:t>Inaccessibility</a:t>
                       </a:r>
-                      <a:endParaRPr sz="1100">
+                    </a:p>
+                    <a:p>
+                      <a:pPr marL="0" lvl="0" indent="0" algn="l" rtl="0">
+                        <a:spcBef>
+                          <a:spcPts val="0"/>
+                        </a:spcBef>
+                        <a:spcAft>
+                          <a:spcPts val="0"/>
+                        </a:spcAft>
+                        <a:buNone/>
+                      </a:pPr>
+                      <a:r>
+                        <a:rPr lang="en-GB" sz="1100" dirty="0">
+                          <a:latin typeface="Google Sans"/>
+                          <a:ea typeface="Google Sans"/>
+                          <a:cs typeface="Google Sans"/>
+                          <a:sym typeface="Google Sans"/>
+                        </a:rPr>
+                        <a:t>Powerless</a:t>
+                      </a:r>
+                      <a:endParaRPr sz="1100" dirty="0">
                         <a:latin typeface="Google Sans"/>
                         <a:ea typeface="Google Sans"/>
                         <a:cs typeface="Google Sans"/>
@@ -23474,7 +23539,7 @@
                         </a:spcAft>
                         <a:buNone/>
                       </a:pPr>
-                      <a:endParaRPr sz="1400"/>
+                      <a:endParaRPr sz="1400" dirty="0"/>
                     </a:p>
                   </a:txBody>
                   <a:tcPr marL="91425" marR="91425" marT="91425" marB="91425">
@@ -23534,15 +23599,15 @@
                         <a:buNone/>
                       </a:pPr>
                       <a:r>
-                        <a:rPr lang="en" sz="1100">
+                        <a:rPr lang="en" sz="1100" dirty="0">
                           <a:latin typeface="Google Sans"/>
                           <a:ea typeface="Google Sans"/>
                           <a:cs typeface="Google Sans"/>
                           <a:sym typeface="Google Sans"/>
                         </a:rPr>
-                        <a:t>User emotions </a:t>
+                        <a:t>Not incharge </a:t>
                       </a:r>
-                      <a:endParaRPr sz="1100">
+                      <a:endParaRPr sz="1100" dirty="0">
                         <a:latin typeface="Google Sans"/>
                         <a:ea typeface="Google Sans"/>
                         <a:cs typeface="Google Sans"/>
@@ -23559,7 +23624,7 @@
                         </a:spcAft>
                         <a:buNone/>
                       </a:pPr>
-                      <a:endParaRPr sz="1400"/>
+                      <a:endParaRPr sz="1400" dirty="0"/>
                     </a:p>
                   </a:txBody>
                   <a:tcPr marL="91425" marR="91425" marT="91425" marB="91425">
@@ -23699,15 +23764,35 @@
                         <a:buNone/>
                       </a:pPr>
                       <a:r>
-                        <a:rPr lang="en" sz="1100">
+                        <a:rPr lang="en-GB" sz="1100" dirty="0">
                           <a:latin typeface="Google Sans"/>
                           <a:ea typeface="Google Sans"/>
                           <a:cs typeface="Google Sans"/>
                           <a:sym typeface="Google Sans"/>
                         </a:rPr>
-                        <a:t>Area to improve </a:t>
+                        <a:t>Make apps name easily remembered</a:t>
                       </a:r>
-                      <a:endParaRPr sz="1100">
+                    </a:p>
+                    <a:p>
+                      <a:pPr marL="0" lvl="0" indent="0" algn="l" rtl="0">
+                        <a:spcBef>
+                          <a:spcPts val="0"/>
+                        </a:spcBef>
+                        <a:spcAft>
+                          <a:spcPts val="0"/>
+                        </a:spcAft>
+                        <a:buNone/>
+                      </a:pPr>
+                      <a:r>
+                        <a:rPr lang="en-GB" sz="1100" dirty="0">
+                          <a:latin typeface="Google Sans"/>
+                          <a:ea typeface="Google Sans"/>
+                          <a:cs typeface="Google Sans"/>
+                          <a:sym typeface="Google Sans"/>
+                        </a:rPr>
+                        <a:t>Make its Icon related to food</a:t>
+                      </a:r>
+                      <a:endParaRPr sz="1100" dirty="0">
                         <a:latin typeface="Google Sans"/>
                         <a:ea typeface="Google Sans"/>
                         <a:cs typeface="Google Sans"/>
@@ -23772,15 +23857,35 @@
                         <a:buNone/>
                       </a:pPr>
                       <a:r>
-                        <a:rPr lang="en" sz="1100">
+                        <a:rPr lang="en-GB" sz="1100" dirty="0">
                           <a:latin typeface="Google Sans"/>
                           <a:ea typeface="Google Sans"/>
                           <a:cs typeface="Google Sans"/>
                           <a:sym typeface="Google Sans"/>
                         </a:rPr>
-                        <a:t>Area to improve </a:t>
+                        <a:t>Add filter access</a:t>
                       </a:r>
-                      <a:endParaRPr sz="1100">
+                    </a:p>
+                    <a:p>
+                      <a:pPr marL="0" lvl="0" indent="0" algn="l" rtl="0">
+                        <a:spcBef>
+                          <a:spcPts val="0"/>
+                        </a:spcBef>
+                        <a:spcAft>
+                          <a:spcPts val="0"/>
+                        </a:spcAft>
+                        <a:buNone/>
+                      </a:pPr>
+                      <a:r>
+                        <a:rPr lang="en-GB" sz="1100" dirty="0">
+                          <a:latin typeface="Google Sans"/>
+                          <a:ea typeface="Google Sans"/>
+                          <a:cs typeface="Google Sans"/>
+                          <a:sym typeface="Google Sans"/>
+                        </a:rPr>
+                        <a:t>Add voice assist, recommendation, and search feature</a:t>
+                      </a:r>
+                      <a:endParaRPr sz="1100" dirty="0">
                         <a:latin typeface="Google Sans"/>
                         <a:ea typeface="Google Sans"/>
                         <a:cs typeface="Google Sans"/>
@@ -23797,7 +23902,7 @@
                         </a:spcAft>
                         <a:buNone/>
                       </a:pPr>
-                      <a:endParaRPr/>
+                      <a:endParaRPr dirty="0"/>
                     </a:p>
                   </a:txBody>
                   <a:tcPr marL="91425" marR="91425" marT="91425" marB="91425">
@@ -23857,15 +23962,15 @@
                         <a:buNone/>
                       </a:pPr>
                       <a:r>
-                        <a:rPr lang="en" sz="1100">
+                        <a:rPr lang="en-GB" sz="1100" dirty="0">
                           <a:latin typeface="Google Sans"/>
                           <a:ea typeface="Google Sans"/>
                           <a:cs typeface="Google Sans"/>
                           <a:sym typeface="Google Sans"/>
                         </a:rPr>
-                        <a:t>Area to improve </a:t>
+                        <a:t>Make basket easily visible on small screens</a:t>
                       </a:r>
-                      <a:endParaRPr sz="1100">
+                      <a:endParaRPr sz="1100" dirty="0">
                         <a:latin typeface="Google Sans"/>
                         <a:ea typeface="Google Sans"/>
                         <a:cs typeface="Google Sans"/>
@@ -23882,7 +23987,7 @@
                         </a:spcAft>
                         <a:buNone/>
                       </a:pPr>
-                      <a:endParaRPr sz="1400"/>
+                      <a:endParaRPr sz="1400" dirty="0"/>
                     </a:p>
                   </a:txBody>
                   <a:tcPr marL="91425" marR="91425" marT="91425" marB="91425">
@@ -23942,15 +24047,24 @@
                         <a:buNone/>
                       </a:pPr>
                       <a:r>
-                        <a:rPr lang="en" sz="1100">
+                        <a:rPr lang="en-GB" sz="1100" dirty="0">
                           <a:latin typeface="Google Sans"/>
                           <a:ea typeface="Google Sans"/>
                           <a:cs typeface="Google Sans"/>
                           <a:sym typeface="Google Sans"/>
                         </a:rPr>
-                        <a:t>Area to improve </a:t>
+                        <a:t>Add proper billing options, like cash, card, and </a:t>
                       </a:r>
-                      <a:endParaRPr sz="1100">
+                      <a:r>
+                        <a:rPr lang="en-GB" sz="1100" dirty="0" err="1">
+                          <a:latin typeface="Google Sans"/>
+                          <a:ea typeface="Google Sans"/>
+                          <a:cs typeface="Google Sans"/>
+                          <a:sym typeface="Google Sans"/>
+                        </a:rPr>
+                        <a:t>upi</a:t>
+                      </a:r>
+                      <a:endParaRPr sz="1100" dirty="0">
                         <a:latin typeface="Google Sans"/>
                         <a:ea typeface="Google Sans"/>
                         <a:cs typeface="Google Sans"/>
@@ -23967,7 +24081,7 @@
                         </a:spcAft>
                         <a:buNone/>
                       </a:pPr>
-                      <a:endParaRPr sz="1400"/>
+                      <a:endParaRPr sz="1400" dirty="0"/>
                     </a:p>
                   </a:txBody>
                   <a:tcPr marL="91425" marR="91425" marT="91425" marB="91425">
@@ -24027,13 +24141,31 @@
                         <a:buNone/>
                       </a:pPr>
                       <a:r>
-                        <a:rPr lang="en" sz="1100" dirty="0">
+                        <a:rPr lang="en-GB" sz="1400" dirty="0">
                           <a:latin typeface="Google Sans"/>
                           <a:ea typeface="Google Sans"/>
                           <a:cs typeface="Google Sans"/>
                           <a:sym typeface="Google Sans"/>
                         </a:rPr>
-                        <a:t>Area to improve </a:t>
+                        <a:t>Add a map and </a:t>
+                      </a:r>
+                      <a:r>
+                        <a:rPr lang="en-GB" sz="1400" dirty="0" err="1">
+                          <a:latin typeface="Google Sans"/>
+                          <a:ea typeface="Google Sans"/>
+                          <a:cs typeface="Google Sans"/>
+                          <a:sym typeface="Google Sans"/>
+                        </a:rPr>
+                        <a:t>gps</a:t>
+                      </a:r>
+                      <a:r>
+                        <a:rPr lang="en-GB" sz="1400" dirty="0">
+                          <a:latin typeface="Google Sans"/>
+                          <a:ea typeface="Google Sans"/>
+                          <a:cs typeface="Google Sans"/>
+                          <a:sym typeface="Google Sans"/>
+                        </a:rPr>
+                        <a:t> tracker</a:t>
                       </a:r>
                       <a:endParaRPr sz="1100" dirty="0">
                         <a:latin typeface="Google Sans"/>
@@ -24041,18 +24173,6 @@
                         <a:cs typeface="Google Sans"/>
                         <a:sym typeface="Google Sans"/>
                       </a:endParaRPr>
-                    </a:p>
-                    <a:p>
-                      <a:pPr marL="0" lvl="0" indent="0" algn="l" rtl="0">
-                        <a:spcBef>
-                          <a:spcPts val="0"/>
-                        </a:spcBef>
-                        <a:spcAft>
-                          <a:spcPts val="0"/>
-                        </a:spcAft>
-                        <a:buNone/>
-                      </a:pPr>
-                      <a:endParaRPr sz="1400" dirty="0"/>
                     </a:p>
                   </a:txBody>
                   <a:tcPr marL="91425" marR="91425" marT="91425" marB="91425">

</xml_diff>